<commit_message>
Update the training for 14.0.4 release, issue #1
</commit_message>
<xml_diff>
--- a/training/00-intro-getting-started-cdss/00-tstool-intro-getting-started-cdss.pptx
+++ b/training/00-intro-getting-started-cdss/00-tstool-intro-getting-started-cdss.pptx
@@ -4559,8 +4559,26 @@
                 <a:latin typeface="Courier New" panose="02070309020205020404" pitchFamily="49" charset="0"/>
                 <a:cs typeface="Courier New" panose="02070309020205020404" pitchFamily="49" charset="0"/>
               </a:rPr>
-              <a:t>C:\Users\user\.tstool\14\DataStores\HydroBase.cfg</a:t>
-            </a:r>
+              <a:t>C:\Users\user</a:t>
+            </a:r>
+            <a:r>
+              <a:rPr lang="en-US">
+                <a:latin typeface="Courier New" panose="02070309020205020404" pitchFamily="49" charset="0"/>
+                <a:cs typeface="Courier New" panose="02070309020205020404" pitchFamily="49" charset="0"/>
+              </a:rPr>
+              <a:t>\.</a:t>
+            </a:r>
+            <a:r>
+              <a:rPr lang="en-US" smtClean="0">
+                <a:latin typeface="Courier New" panose="02070309020205020404" pitchFamily="49" charset="0"/>
+                <a:cs typeface="Courier New" panose="02070309020205020404" pitchFamily="49" charset="0"/>
+              </a:rPr>
+              <a:t>tstool\14\datastores\HydroBase.cfg</a:t>
+            </a:r>
+            <a:endParaRPr lang="en-US" dirty="0">
+              <a:latin typeface="Courier New" panose="02070309020205020404" pitchFamily="49" charset="0"/>
+              <a:cs typeface="Courier New" panose="02070309020205020404" pitchFamily="49" charset="0"/>
+            </a:endParaRPr>
           </a:p>
           <a:p>
             <a:pPr marL="571500" indent="-457200">

</xml_diff>